<commit_message>
Polish off Figures and Fonts
</commit_message>
<xml_diff>
--- a/SrikarP_FilmProject.pptx
+++ b/SrikarP_FilmProject.pptx
@@ -7597,7 +7597,7 @@
               </a:lnSpc>
               <a:buNone/>
             </a:pPr>
-            <a:fld id="{717540E5-71F6-4BEA-B8B5-0B6FE4521615}" type="slidenum">
+            <a:fld id="{8E8DB952-BC2C-4C31-9DFE-2CA0687830D0}" type="slidenum">
               <a:rPr b="0" lang="en-US" sz="1400" spc="-1" strike="noStrike">
                 <a:solidFill>
                   <a:srgbClr val="000000"/>
@@ -8167,7 +8167,7 @@
               </a:lnSpc>
               <a:buNone/>
             </a:pPr>
-            <a:fld id="{5643322E-C91E-4FE5-9C90-FACC32D29C49}" type="slidenum">
+            <a:fld id="{BE616B68-BFE2-4205-9EA5-0F67EB21E357}" type="slidenum">
               <a:rPr b="0" lang="en-US" sz="1400" spc="-1" strike="noStrike">
                 <a:solidFill>
                   <a:srgbClr val="ffffff"/>
@@ -8967,9 +8967,194 @@
                 </a:solidFill>
                 <a:latin typeface="Courier New"/>
               </a:rPr>
-              <a:t>Action: Oscar-Winning Movies</a:t>
+              <a:t>3.1 Action: Oscar-Nominated Movies</a:t>
             </a:r>
             <a:endParaRPr b="0" lang="en-US" sz="2600" spc="-1" strike="noStrike">
+              <a:latin typeface="Arial"/>
+            </a:endParaRPr>
+          </a:p>
+        </p:txBody>
+      </p:sp>
+      <p:pic>
+        <p:nvPicPr>
+          <p:cNvPr id="228" name="" descr=""/>
+          <p:cNvPicPr/>
+          <p:nvPr/>
+        </p:nvPicPr>
+        <p:blipFill>
+          <a:blip r:embed="rId1"/>
+          <a:stretch/>
+        </p:blipFill>
+        <p:spPr>
+          <a:xfrm>
+            <a:off x="0" y="1562400"/>
+            <a:ext cx="8001000" cy="3924000"/>
+          </a:xfrm>
+          <a:prstGeom prst="rect">
+            <a:avLst/>
+          </a:prstGeom>
+          <a:ln w="0">
+            <a:noFill/>
+          </a:ln>
+        </p:spPr>
+      </p:pic>
+      <p:sp>
+        <p:nvSpPr>
+          <p:cNvPr id="229" name=""/>
+          <p:cNvSpPr txBox="1"/>
+          <p:nvPr/>
+        </p:nvSpPr>
+        <p:spPr>
+          <a:xfrm>
+            <a:off x="8001000" y="1600200"/>
+            <a:ext cx="2057400" cy="2905920"/>
+          </a:xfrm>
+          <a:prstGeom prst="rect">
+            <a:avLst/>
+          </a:prstGeom>
+          <a:noFill/>
+          <a:ln w="0">
+            <a:noFill/>
+          </a:ln>
+        </p:spPr>
+        <p:txBody>
+          <a:bodyPr lIns="90000" rIns="90000" tIns="45000" bIns="45000" anchor="t">
+            <a:noAutofit/>
+          </a:bodyPr>
+          <a:p>
+            <a:r>
+              <a:rPr b="0" lang="en-US" sz="1800" spc="-1" strike="noStrike">
+                <a:latin typeface="Arial"/>
+              </a:rPr>
+              <a:t>Of 54 total:</a:t>
+            </a:r>
+            <a:endParaRPr b="0" lang="en-US" sz="1800" spc="-1" strike="noStrike">
+              <a:latin typeface="Arial"/>
+            </a:endParaRPr>
+          </a:p>
+          <a:p>
+            <a:endParaRPr b="0" lang="en-US" sz="1800" spc="-1" strike="noStrike">
+              <a:latin typeface="Arial"/>
+            </a:endParaRPr>
+          </a:p>
+          <a:p>
+            <a:r>
+              <a:rPr b="0" lang="en-US" sz="1800" spc="-1" strike="noStrike">
+                <a:latin typeface="Arial"/>
+                <a:ea typeface="Source Han Sans CN"/>
+              </a:rPr>
+              <a:t>24 </a:t>
+            </a:r>
+            <a:r>
+              <a:rPr b="0" lang="en-US" sz="1800" spc="-1" strike="noStrike">
+                <a:latin typeface="Arial"/>
+              </a:rPr>
+              <a:t>(44%): </a:t>
+            </a:r>
+            <a:endParaRPr b="0" lang="en-US" sz="1800" spc="-1" strike="noStrike">
+              <a:latin typeface="Arial"/>
+            </a:endParaRPr>
+          </a:p>
+          <a:p>
+            <a:pPr marL="216000" indent="-216000">
+              <a:buClr>
+                <a:srgbClr val="000000"/>
+              </a:buClr>
+              <a:buSzPct val="45000"/>
+              <a:buFont typeface="Wingdings" charset="2"/>
+              <a:buChar char=""/>
+            </a:pPr>
+            <a:r>
+              <a:rPr b="0" lang="en-US" sz="1800" spc="-1" strike="noStrike">
+                <a:latin typeface="Arial"/>
+              </a:rPr>
+              <a:t>Big Bad </a:t>
+            </a:r>
+            <a:endParaRPr b="0" lang="en-US" sz="1800" spc="-1" strike="noStrike">
+              <a:latin typeface="Arial"/>
+            </a:endParaRPr>
+          </a:p>
+          <a:p>
+            <a:endParaRPr b="0" lang="en-US" sz="1800" spc="-1" strike="noStrike">
+              <a:latin typeface="Arial"/>
+            </a:endParaRPr>
+          </a:p>
+          <a:p>
+            <a:r>
+              <a:rPr b="0" lang="en-US" sz="1800" spc="-1" strike="noStrike">
+                <a:latin typeface="Arial"/>
+                <a:ea typeface="Source Han Sans CN"/>
+              </a:rPr>
+              <a:t>22 </a:t>
+            </a:r>
+            <a:r>
+              <a:rPr b="0" lang="en-US" sz="1800" spc="-1" strike="noStrike">
+                <a:latin typeface="Arial"/>
+              </a:rPr>
+              <a:t>(41%): </a:t>
+            </a:r>
+            <a:endParaRPr b="0" lang="en-US" sz="1800" spc="-1" strike="noStrike">
+              <a:latin typeface="Arial"/>
+            </a:endParaRPr>
+          </a:p>
+          <a:p>
+            <a:pPr marL="216000" indent="-216000">
+              <a:buClr>
+                <a:srgbClr val="000000"/>
+              </a:buClr>
+              <a:buSzPct val="45000"/>
+              <a:buFont typeface="Wingdings" charset="2"/>
+              <a:buChar char=""/>
+            </a:pPr>
+            <a:r>
+              <a:rPr b="0" lang="en-US" sz="1800" spc="-1" strike="noStrike">
+                <a:latin typeface="Arial"/>
+              </a:rPr>
+              <a:t>Actor Allusion</a:t>
+            </a:r>
+            <a:endParaRPr b="0" lang="en-US" sz="1800" spc="-1" strike="noStrike">
+              <a:latin typeface="Arial"/>
+            </a:endParaRPr>
+          </a:p>
+          <a:p>
+            <a:endParaRPr b="0" lang="en-US" sz="1800" spc="-1" strike="noStrike">
+              <a:latin typeface="Arial"/>
+            </a:endParaRPr>
+          </a:p>
+          <a:p>
+            <a:r>
+              <a:rPr b="0" lang="en-US" sz="1800" spc="-1" strike="noStrike">
+                <a:latin typeface="Arial"/>
+                <a:ea typeface="Source Han Sans CN"/>
+              </a:rPr>
+              <a:t>18 </a:t>
+            </a:r>
+            <a:r>
+              <a:rPr b="0" lang="en-US" sz="1800" spc="-1" strike="noStrike">
+                <a:latin typeface="Arial"/>
+              </a:rPr>
+              <a:t>(33%):</a:t>
+            </a:r>
+            <a:endParaRPr b="0" lang="en-US" sz="1800" spc="-1" strike="noStrike">
+              <a:latin typeface="Arial"/>
+            </a:endParaRPr>
+          </a:p>
+          <a:p>
+            <a:pPr marL="216000" indent="-216000">
+              <a:buClr>
+                <a:srgbClr val="000000"/>
+              </a:buClr>
+              <a:buSzPct val="45000"/>
+              <a:buFont typeface="Wingdings" charset="2"/>
+              <a:buChar char=""/>
+            </a:pPr>
+            <a:r>
+              <a:rPr b="0" lang="en-US" sz="1800" spc="-1" strike="noStrike">
+                <a:latin typeface="Arial"/>
+              </a:rPr>
+              <a:t>Bittersweet Ending </a:t>
+            </a:r>
+            <a:endParaRPr b="0" lang="en-US" sz="1800" spc="-1" strike="noStrike">
               <a:latin typeface="Arial"/>
             </a:endParaRPr>
           </a:p>
@@ -9007,7 +9192,7 @@
       </p:grpSpPr>
       <p:sp>
         <p:nvSpPr>
-          <p:cNvPr id="228" name="PlaceHolder 1"/>
+          <p:cNvPr id="230" name="PlaceHolder 1"/>
           <p:cNvSpPr>
             <a:spLocks noGrp="1"/>
           </p:cNvSpPr>
@@ -9049,9 +9234,229 @@
                 </a:solidFill>
                 <a:latin typeface="Courier New"/>
               </a:rPr>
-              <a:t>Crime: Highest-Grossing Movies</a:t>
+              <a:t>3.2 Crime: Highest-Grossing Movies (&gt;$100M)</a:t>
             </a:r>
             <a:endParaRPr b="0" lang="en-US" sz="2600" spc="-1" strike="noStrike">
+              <a:latin typeface="Arial"/>
+            </a:endParaRPr>
+          </a:p>
+        </p:txBody>
+      </p:sp>
+      <p:pic>
+        <p:nvPicPr>
+          <p:cNvPr id="231" name="" descr=""/>
+          <p:cNvPicPr/>
+          <p:nvPr/>
+        </p:nvPicPr>
+        <p:blipFill>
+          <a:blip r:embed="rId1"/>
+          <a:stretch/>
+        </p:blipFill>
+        <p:spPr>
+          <a:xfrm>
+            <a:off x="100080" y="1371600"/>
+            <a:ext cx="7900920" cy="4216320"/>
+          </a:xfrm>
+          <a:prstGeom prst="rect">
+            <a:avLst/>
+          </a:prstGeom>
+          <a:ln w="0">
+            <a:noFill/>
+          </a:ln>
+        </p:spPr>
+      </p:pic>
+      <p:sp>
+        <p:nvSpPr>
+          <p:cNvPr id="232" name=""/>
+          <p:cNvSpPr txBox="1"/>
+          <p:nvPr/>
+        </p:nvSpPr>
+        <p:spPr>
+          <a:xfrm>
+            <a:off x="8001000" y="1402200"/>
+            <a:ext cx="2057400" cy="4185720"/>
+          </a:xfrm>
+          <a:prstGeom prst="rect">
+            <a:avLst/>
+          </a:prstGeom>
+          <a:noFill/>
+          <a:ln w="0">
+            <a:noFill/>
+          </a:ln>
+        </p:spPr>
+        <p:txBody>
+          <a:bodyPr lIns="90000" rIns="90000" tIns="45000" bIns="45000" anchor="t">
+            <a:noAutofit/>
+          </a:bodyPr>
+          <a:p>
+            <a:r>
+              <a:rPr b="1" lang="en-US" sz="1600" spc="-1" strike="noStrike">
+                <a:latin typeface="Courier New"/>
+              </a:rPr>
+              <a:t>Of 22 Movies</a:t>
+            </a:r>
+            <a:r>
+              <a:rPr b="0" lang="en-US" sz="1600" spc="-1" strike="noStrike">
+                <a:latin typeface="Courier New"/>
+              </a:rPr>
+              <a:t>:</a:t>
+            </a:r>
+            <a:endParaRPr b="0" lang="en-US" sz="1600" spc="-1" strike="noStrike">
+              <a:latin typeface="Arial"/>
+            </a:endParaRPr>
+          </a:p>
+          <a:p>
+            <a:endParaRPr b="0" lang="en-US" sz="1600" spc="-1" strike="noStrike">
+              <a:latin typeface="Arial"/>
+            </a:endParaRPr>
+          </a:p>
+          <a:p>
+            <a:r>
+              <a:rPr b="0" lang="en-US" sz="1600" spc="-1" strike="noStrike">
+                <a:latin typeface="Courier New"/>
+              </a:rPr>
+              <a:t>14 (64%):</a:t>
+            </a:r>
+            <a:endParaRPr b="0" lang="en-US" sz="1600" spc="-1" strike="noStrike">
+              <a:latin typeface="Arial"/>
+            </a:endParaRPr>
+          </a:p>
+          <a:p>
+            <a:pPr marL="216000" indent="-216000">
+              <a:buClr>
+                <a:srgbClr val="000000"/>
+              </a:buClr>
+              <a:buSzPct val="45000"/>
+              <a:buFont typeface="Wingdings" charset="2"/>
+              <a:buChar char=""/>
+            </a:pPr>
+            <a:r>
+              <a:rPr b="0" lang="en-US" sz="1600" spc="-1" strike="noStrike">
+                <a:latin typeface="Courier New"/>
+              </a:rPr>
+              <a:t>Shout Out</a:t>
+            </a:r>
+            <a:endParaRPr b="0" lang="en-US" sz="1600" spc="-1" strike="noStrike">
+              <a:latin typeface="Arial"/>
+            </a:endParaRPr>
+          </a:p>
+          <a:p>
+            <a:endParaRPr b="0" lang="en-US" sz="1600" spc="-1" strike="noStrike">
+              <a:latin typeface="Arial"/>
+            </a:endParaRPr>
+          </a:p>
+          <a:p>
+            <a:r>
+              <a:rPr b="0" lang="en-US" sz="1600" spc="-1" strike="noStrike">
+                <a:latin typeface="Courier New"/>
+              </a:rPr>
+              <a:t>12 (55%):</a:t>
+            </a:r>
+            <a:endParaRPr b="0" lang="en-US" sz="1600" spc="-1" strike="noStrike">
+              <a:latin typeface="Arial"/>
+            </a:endParaRPr>
+          </a:p>
+          <a:p>
+            <a:pPr marL="216000" indent="-216000">
+              <a:buClr>
+                <a:srgbClr val="000000"/>
+              </a:buClr>
+              <a:buSzPct val="45000"/>
+              <a:buFont typeface="Wingdings" charset="2"/>
+              <a:buChar char=""/>
+            </a:pPr>
+            <a:r>
+              <a:rPr b="0" lang="en-US" sz="1600" spc="-1" strike="noStrike">
+                <a:latin typeface="Courier New"/>
+              </a:rPr>
+              <a:t>Foreshadowing</a:t>
+            </a:r>
+            <a:endParaRPr b="0" lang="en-US" sz="1600" spc="-1" strike="noStrike">
+              <a:latin typeface="Arial"/>
+            </a:endParaRPr>
+          </a:p>
+          <a:p>
+            <a:endParaRPr b="0" lang="en-US" sz="1600" spc="-1" strike="noStrike">
+              <a:latin typeface="Arial"/>
+            </a:endParaRPr>
+          </a:p>
+          <a:p>
+            <a:r>
+              <a:rPr b="0" lang="en-US" sz="1600" spc="-1" strike="noStrike">
+                <a:latin typeface="Courier New"/>
+              </a:rPr>
+              <a:t>9 (41%):</a:t>
+            </a:r>
+            <a:endParaRPr b="0" lang="en-US" sz="1600" spc="-1" strike="noStrike">
+              <a:latin typeface="Arial"/>
+            </a:endParaRPr>
+          </a:p>
+          <a:p>
+            <a:pPr marL="216000" indent="-216000">
+              <a:buClr>
+                <a:srgbClr val="000000"/>
+              </a:buClr>
+              <a:buSzPct val="45000"/>
+              <a:buFont typeface="Wingdings" charset="2"/>
+              <a:buChar char=""/>
+            </a:pPr>
+            <a:r>
+              <a:rPr b="0" lang="en-US" sz="1600" spc="-1" strike="noStrike">
+                <a:latin typeface="Courier New"/>
+              </a:rPr>
+              <a:t>Berserk Button, </a:t>
+            </a:r>
+            <a:endParaRPr b="0" lang="en-US" sz="1600" spc="-1" strike="noStrike">
+              <a:latin typeface="Arial"/>
+            </a:endParaRPr>
+          </a:p>
+          <a:p>
+            <a:pPr marL="216000" indent="-216000">
+              <a:buClr>
+                <a:srgbClr val="000000"/>
+              </a:buClr>
+              <a:buSzPct val="45000"/>
+              <a:buFont typeface="Wingdings" charset="2"/>
+              <a:buChar char=""/>
+            </a:pPr>
+            <a:r>
+              <a:rPr b="0" lang="en-US" sz="1600" spc="-1" strike="noStrike">
+                <a:latin typeface="Courier New"/>
+              </a:rPr>
+              <a:t>Checkovs Gun, </a:t>
+            </a:r>
+            <a:endParaRPr b="0" lang="en-US" sz="1600" spc="-1" strike="noStrike">
+              <a:latin typeface="Arial"/>
+            </a:endParaRPr>
+          </a:p>
+          <a:p>
+            <a:pPr marL="216000" indent="-216000">
+              <a:buClr>
+                <a:srgbClr val="000000"/>
+              </a:buClr>
+              <a:buSzPct val="45000"/>
+              <a:buFont typeface="Wingdings" charset="2"/>
+              <a:buChar char=""/>
+            </a:pPr>
+            <a:r>
+              <a:rPr b="0" lang="en-US" sz="1600" spc="-1" strike="noStrike">
+                <a:latin typeface="Courier New"/>
+              </a:rPr>
+              <a:t>“</a:t>
+            </a:r>
+            <a:r>
+              <a:rPr b="0" lang="en-US" sz="1600" spc="-1" strike="noStrike">
+                <a:latin typeface="Courier New"/>
+              </a:rPr>
+              <a:t>Oh Crap”</a:t>
+            </a:r>
+            <a:r>
+              <a:rPr b="0" lang="en-US" sz="1800" spc="-1" strike="noStrike">
+                <a:latin typeface="Arial"/>
+              </a:rPr>
+              <a:t> </a:t>
+            </a:r>
+            <a:endParaRPr b="0" lang="en-US" sz="1800" spc="-1" strike="noStrike">
               <a:latin typeface="Arial"/>
             </a:endParaRPr>
           </a:p>
@@ -9089,7 +9494,7 @@
       </p:grpSpPr>
       <p:sp>
         <p:nvSpPr>
-          <p:cNvPr id="229" name="PlaceHolder 1"/>
+          <p:cNvPr id="233" name="PlaceHolder 1"/>
           <p:cNvSpPr>
             <a:spLocks noGrp="1"/>
           </p:cNvSpPr>
@@ -9128,7 +9533,7 @@
                 </a:solidFill>
                 <a:latin typeface="Courier New"/>
               </a:rPr>
-              <a:t>Next Steps</a:t>
+              <a:t>4. Next Steps</a:t>
             </a:r>
             <a:endParaRPr b="0" lang="en-US" sz="4400" spc="-1" strike="noStrike">
               <a:latin typeface="Arial"/>
@@ -9138,7 +9543,7 @@
       </p:sp>
       <p:sp>
         <p:nvSpPr>
-          <p:cNvPr id="230" name="PlaceHolder 2"/>
+          <p:cNvPr id="234" name="PlaceHolder 2"/>
           <p:cNvSpPr>
             <a:spLocks noGrp="1"/>
           </p:cNvSpPr>
@@ -9148,8 +9553,8 @@
         </p:nvSpPr>
         <p:spPr>
           <a:xfrm>
-            <a:off x="3969000" y="1283760"/>
-            <a:ext cx="5631480" cy="3973320"/>
+            <a:off x="228600" y="1284480"/>
+            <a:ext cx="3780360" cy="3973320"/>
           </a:xfrm>
           <a:prstGeom prst="rect">
             <a:avLst/>
@@ -9161,7 +9566,7 @@
         </p:spPr>
         <p:txBody>
           <a:bodyPr lIns="0" rIns="0" tIns="0" bIns="0" anchor="t">
-            <a:normAutofit fontScale="67000"/>
+            <a:normAutofit fontScale="57000"/>
           </a:bodyPr>
           <a:p>
             <a:pPr marL="432000" indent="-324000">
@@ -9194,7 +9599,7 @@
                 </a:solidFill>
                 <a:latin typeface="Courier New"/>
               </a:rPr>
-              <a:t>Quantification of each tropes occurance</a:t>
+              <a:t>Quantification of each tropes occurance. Compare Winners to Nominated.</a:t>
             </a:r>
             <a:endParaRPr b="0" lang="en-US" sz="3200" spc="-1" strike="noStrike">
               <a:latin typeface="Arial"/>
@@ -9327,6 +9732,29 @@
           </a:p>
         </p:txBody>
       </p:sp>
+      <p:pic>
+        <p:nvPicPr>
+          <p:cNvPr id="235" name="" descr=""/>
+          <p:cNvPicPr/>
+          <p:nvPr/>
+        </p:nvPicPr>
+        <p:blipFill>
+          <a:blip r:embed="rId1"/>
+          <a:stretch/>
+        </p:blipFill>
+        <p:spPr>
+          <a:xfrm>
+            <a:off x="4471560" y="1456920"/>
+            <a:ext cx="5358240" cy="3572280"/>
+          </a:xfrm>
+          <a:prstGeom prst="rect">
+            <a:avLst/>
+          </a:prstGeom>
+          <a:ln w="0">
+            <a:noFill/>
+          </a:ln>
+        </p:spPr>
+      </p:pic>
     </p:spTree>
   </p:cSld>
   <mc:AlternateContent>
@@ -9359,7 +9787,7 @@
       </p:grpSpPr>
       <p:sp>
         <p:nvSpPr>
-          <p:cNvPr id="231" name="PlaceHolder 1"/>
+          <p:cNvPr id="236" name="PlaceHolder 1"/>
           <p:cNvSpPr>
             <a:spLocks noGrp="1"/>
           </p:cNvSpPr>
@@ -9369,8 +9797,8 @@
         </p:nvSpPr>
         <p:spPr>
           <a:xfrm>
-            <a:off x="540000" y="270000"/>
-            <a:ext cx="8998560" cy="988560"/>
+            <a:off x="4114800" y="228600"/>
+            <a:ext cx="1600200" cy="988560"/>
           </a:xfrm>
           <a:prstGeom prst="rect">
             <a:avLst/>
@@ -9405,33 +9833,74 @@
       </p:sp>
       <p:sp>
         <p:nvSpPr>
-          <p:cNvPr id="232" name="PlaceHolder 2"/>
-          <p:cNvSpPr>
-            <a:spLocks noGrp="1"/>
-          </p:cNvSpPr>
-          <p:nvPr>
-            <p:ph/>
-          </p:nvPr>
-        </p:nvSpPr>
-        <p:spPr>
-          <a:xfrm>
-            <a:off x="540000" y="1440000"/>
-            <a:ext cx="8998560" cy="3598560"/>
-          </a:xfrm>
-          <a:prstGeom prst="rect">
-            <a:avLst/>
-          </a:prstGeom>
-          <a:noFill/>
-          <a:ln w="0">
-            <a:noFill/>
-          </a:ln>
-        </p:spPr>
-        <p:txBody>
-          <a:bodyPr lIns="0" rIns="0" tIns="0" bIns="0" anchor="t">
-            <a:normAutofit/>
-          </a:bodyPr>
-          <a:p>
-            <a:endParaRPr b="0" lang="en-US" sz="3200" spc="-1" strike="noStrike">
+          <p:cNvPr id="237" name=""/>
+          <p:cNvSpPr txBox="1"/>
+          <p:nvPr/>
+        </p:nvSpPr>
+        <p:spPr>
+          <a:xfrm>
+            <a:off x="111240" y="1143000"/>
+            <a:ext cx="9969480" cy="2192040"/>
+          </a:xfrm>
+          <a:prstGeom prst="rect">
+            <a:avLst/>
+          </a:prstGeom>
+          <a:noFill/>
+          <a:ln w="0">
+            <a:noFill/>
+          </a:ln>
+        </p:spPr>
+        <p:txBody>
+          <a:bodyPr lIns="90000" rIns="90000" tIns="45000" bIns="45000" anchor="t">
+            <a:noAutofit/>
+          </a:bodyPr>
+          <a:p>
+            <a:r>
+              <a:rPr b="0" lang="en-US" sz="1000" spc="-1" strike="noStrike">
+                <a:latin typeface="Arial"/>
+              </a:rPr>
+              <a:t>Vipul, (U. (2020, September 8). Oscars nominated movies 2000-2017. Kaggle. Retrieved January 31, 2022, from </a:t>
+            </a:r>
+            <a:r>
+              <a:rPr b="0" lang="en-US" sz="1000" spc="-1" strike="noStrike">
+                <a:latin typeface="Arial"/>
+                <a:hlinkClick r:id="rId1"/>
+              </a:rPr>
+              <a:t>https://www.kaggle.com/vipulgote4/oscars-nominated-movies-from-2000-to-2017</a:t>
+            </a:r>
+            <a:endParaRPr b="0" lang="en-US" sz="1000" spc="-1" strike="noStrike">
+              <a:latin typeface="Arial"/>
+            </a:endParaRPr>
+          </a:p>
+          <a:p>
+            <a:r>
+              <a:rPr b="0" lang="en-US" sz="1000" spc="-1" strike="noStrike">
+                <a:latin typeface="Arial"/>
+              </a:rPr>
+              <a:t>email, S. G. S. an, Ghazanchyan, S., &amp;amp; email, S. an. (2021, December 7). Armenia Movie Wins Gold at tokyo film awards. Public Radio of Armenia. Retrieved January 31, 2022, from https://en.armradio.am/2021/12/07/armenia-movie-wins-golden-winner-prize-at-tokyo-film-awards/ </a:t>
+            </a:r>
+            <a:endParaRPr b="0" lang="en-US" sz="1000" spc="-1" strike="noStrike">
+              <a:latin typeface="Arial"/>
+            </a:endParaRPr>
+          </a:p>
+          <a:p>
+            <a:endParaRPr b="0" lang="en-US" sz="1000" spc="-1" strike="noStrike">
+              <a:latin typeface="Arial"/>
+            </a:endParaRPr>
+          </a:p>
+          <a:p>
+            <a:r>
+              <a:rPr b="0" lang="en-US" sz="1000" spc="-1" strike="noStrike">
+                <a:latin typeface="Arial"/>
+              </a:rPr>
+              <a:t> </a:t>
+            </a:r>
+            <a:endParaRPr b="0" lang="en-US" sz="1000" spc="-1" strike="noStrike">
+              <a:latin typeface="Arial"/>
+            </a:endParaRPr>
+          </a:p>
+          <a:p>
+            <a:endParaRPr b="0" lang="en-US" sz="1000" spc="-1" strike="noStrike">
               <a:latin typeface="Arial"/>
             </a:endParaRPr>
           </a:p>
@@ -9574,6 +10043,15 @@
                 </a:solidFill>
                 <a:latin typeface="Courier New"/>
               </a:rPr>
+              <a:t>1. </a:t>
+            </a:r>
+            <a:r>
+              <a:rPr b="1" lang="en-US" sz="3200" spc="-1" strike="noStrike">
+                <a:solidFill>
+                  <a:srgbClr val="ffffff"/>
+                </a:solidFill>
+                <a:latin typeface="Courier New"/>
+              </a:rPr>
               <a:t>Introduction</a:t>
             </a:r>
             <a:endParaRPr b="0" lang="en-US" sz="3200" spc="-1" strike="noStrike">
@@ -9602,7 +10080,7 @@
                 </a:solidFill>
                 <a:latin typeface="Courier New"/>
               </a:rPr>
-              <a:t>What Are Tropes?</a:t>
+              <a:t>1.1 What Are Tropes?</a:t>
             </a:r>
             <a:endParaRPr b="0" lang="en-US" sz="2800" spc="-1" strike="noStrike">
               <a:latin typeface="Arial"/>
@@ -9630,7 +10108,7 @@
                 </a:solidFill>
                 <a:latin typeface="Courier New"/>
               </a:rPr>
-              <a:t>Premise</a:t>
+              <a:t>1.2 Premise</a:t>
             </a:r>
             <a:endParaRPr b="0" lang="en-US" sz="2800" spc="-1" strike="noStrike">
               <a:latin typeface="Arial"/>
@@ -9658,7 +10136,7 @@
                 </a:solidFill>
                 <a:latin typeface="Courier New"/>
               </a:rPr>
-              <a:t>Execution</a:t>
+              <a:t>1.3 Execution</a:t>
             </a:r>
             <a:endParaRPr b="0" lang="en-US" sz="2800" spc="-1" strike="noStrike">
               <a:latin typeface="Arial"/>
@@ -9695,6 +10173,15 @@
                 </a:solidFill>
                 <a:latin typeface="Courier New"/>
               </a:rPr>
+              <a:t>2. </a:t>
+            </a:r>
+            <a:r>
+              <a:rPr b="1" lang="en-US" sz="3200" spc="-1" strike="noStrike">
+                <a:solidFill>
+                  <a:srgbClr val="ffffff"/>
+                </a:solidFill>
+                <a:latin typeface="Courier New"/>
+              </a:rPr>
               <a:t>Yearwise Analysis</a:t>
             </a:r>
             <a:endParaRPr b="0" lang="en-US" sz="3200" spc="-1" strike="noStrike">
@@ -9723,7 +10210,7 @@
                 </a:solidFill>
                 <a:latin typeface="Courier New"/>
               </a:rPr>
-              <a:t>Oscar Best Picture 2008-2017</a:t>
+              <a:t>2.1 Oscar Best Picture 2008-2017</a:t>
             </a:r>
             <a:endParaRPr b="0" lang="en-US" sz="2800" spc="-1" strike="noStrike">
               <a:latin typeface="Arial"/>
@@ -9751,7 +10238,7 @@
                 </a:solidFill>
                 <a:latin typeface="Courier New"/>
               </a:rPr>
-              <a:t>Highest Grossing 2008-2017</a:t>
+              <a:t>2.2 Highest Grossing 2008-2017</a:t>
             </a:r>
             <a:endParaRPr b="0" lang="en-US" sz="2800" spc="-1" strike="noStrike">
               <a:latin typeface="Arial"/>
@@ -9788,6 +10275,15 @@
                 </a:solidFill>
                 <a:latin typeface="Courier New"/>
               </a:rPr>
+              <a:t>3. </a:t>
+            </a:r>
+            <a:r>
+              <a:rPr b="1" lang="en-US" sz="3200" spc="-1" strike="noStrike">
+                <a:solidFill>
+                  <a:srgbClr val="ffffff"/>
+                </a:solidFill>
+                <a:latin typeface="Courier New"/>
+              </a:rPr>
               <a:t>Genrewise Analysis</a:t>
             </a:r>
             <a:endParaRPr b="0" lang="en-US" sz="3200" spc="-1" strike="noStrike">
@@ -9816,7 +10312,7 @@
                 </a:solidFill>
                 <a:latin typeface="Courier New"/>
               </a:rPr>
-              <a:t>Oscar Winning Action Movies</a:t>
+              <a:t>3.1 Oscar Winning Action Movies</a:t>
             </a:r>
             <a:endParaRPr b="0" lang="en-US" sz="2800" spc="-1" strike="noStrike">
               <a:latin typeface="Arial"/>
@@ -9844,7 +10340,7 @@
                 </a:solidFill>
                 <a:latin typeface="Courier New"/>
               </a:rPr>
-              <a:t>Highest Grossing Crime Movies</a:t>
+              <a:t>3.2 Highest Grossing Crime Movies</a:t>
             </a:r>
             <a:endParaRPr b="0" lang="en-US" sz="2800" spc="-1" strike="noStrike">
               <a:latin typeface="Arial"/>
@@ -9876,6 +10372,15 @@
             </a:r>
             <a:r>
               <a:rPr b="0" lang="en-US" sz="3200" spc="-1" strike="noStrike">
+                <a:solidFill>
+                  <a:srgbClr val="ffffff"/>
+                </a:solidFill>
+                <a:latin typeface="Courier New"/>
+              </a:rPr>
+              <a:t>4. </a:t>
+            </a:r>
+            <a:r>
+              <a:rPr b="1" lang="en-US" sz="3200" spc="-1" strike="noStrike">
                 <a:solidFill>
                   <a:srgbClr val="ffffff"/>
                 </a:solidFill>
@@ -9986,7 +10491,7 @@
                 </a:solidFill>
                 <a:latin typeface="Courier New"/>
               </a:rPr>
-              <a:t>Introduction: What Are Tropes?</a:t>
+              <a:t>1.1 Introduction: What Are Tropes?</a:t>
             </a:r>
             <a:endParaRPr b="0" lang="en-US" sz="2600" spc="-1" strike="noStrike">
               <a:latin typeface="Arial"/>
@@ -10059,13 +10564,25 @@
               <a:buChar char=""/>
             </a:pPr>
             <a:r>
-              <a:rPr b="0" lang="en-US" sz="1800" spc="-1" strike="noStrike">
-                <a:latin typeface="Arial"/>
-              </a:rPr>
-              <a:t>Dictionary Defintion of a trope is a figure of speech</a:t>
-            </a:r>
-            <a:endParaRPr b="0" lang="en-US" sz="1800" spc="-1" strike="noStrike">
-              <a:latin typeface="Arial"/>
+              <a:rPr b="0" lang="en-US" sz="1600" spc="-1" strike="noStrike">
+                <a:latin typeface="Courier New"/>
+              </a:rPr>
+              <a:t>Dictionary Defintion of a </a:t>
+            </a:r>
+            <a:r>
+              <a:rPr b="1" lang="en-US" sz="1600" spc="-1" strike="noStrike">
+                <a:latin typeface="Courier New"/>
+              </a:rPr>
+              <a:t>trope</a:t>
+            </a:r>
+            <a:r>
+              <a:rPr b="0" lang="en-US" sz="1600" spc="-1" strike="noStrike">
+                <a:latin typeface="Courier New"/>
+              </a:rPr>
+              <a:t> is a figure of speech</a:t>
+            </a:r>
+            <a:endParaRPr b="0" lang="en-US" sz="1600" spc="-1" strike="noStrike">
+              <a:latin typeface="Courier New"/>
             </a:endParaRPr>
           </a:p>
           <a:p>
@@ -10075,8 +10592,8 @@
               </a:lnSpc>
               <a:buNone/>
             </a:pPr>
-            <a:endParaRPr b="0" lang="en-US" sz="1800" spc="-1" strike="noStrike">
-              <a:latin typeface="Arial"/>
+            <a:endParaRPr b="0" lang="en-US" sz="1600" spc="-1" strike="noStrike">
+              <a:latin typeface="Courier New"/>
             </a:endParaRPr>
           </a:p>
           <a:p>
@@ -10092,13 +10609,13 @@
               <a:buChar char=""/>
             </a:pPr>
             <a:r>
-              <a:rPr b="0" lang="en-US" sz="1800" spc="-1" strike="noStrike">
-                <a:latin typeface="Arial"/>
+              <a:rPr b="0" lang="en-US" sz="1600" spc="-1" strike="noStrike">
+                <a:latin typeface="Courier New"/>
               </a:rPr>
               <a:t>In colloquial, or literary terms a trope is a storytelling “figure of speech” or shorthand.</a:t>
             </a:r>
-            <a:endParaRPr b="0" lang="en-US" sz="1800" spc="-1" strike="noStrike">
-              <a:latin typeface="Arial"/>
+            <a:endParaRPr b="0" lang="en-US" sz="1600" spc="-1" strike="noStrike">
+              <a:latin typeface="Courier New"/>
             </a:endParaRPr>
           </a:p>
           <a:p>
@@ -10108,8 +10625,8 @@
               </a:lnSpc>
               <a:buNone/>
             </a:pPr>
-            <a:endParaRPr b="0" lang="en-US" sz="1800" spc="-1" strike="noStrike">
-              <a:latin typeface="Arial"/>
+            <a:endParaRPr b="0" lang="en-US" sz="1600" spc="-1" strike="noStrike">
+              <a:latin typeface="Courier New"/>
             </a:endParaRPr>
           </a:p>
           <a:p>
@@ -10125,13 +10642,25 @@
               <a:buChar char=""/>
             </a:pPr>
             <a:r>
-              <a:rPr b="0" lang="en-US" sz="1800" spc="-1" strike="noStrike">
-                <a:latin typeface="Arial"/>
-              </a:rPr>
-              <a:t>Tropes can be diverse: “Hero”, “Big Bad”, “Love Triangle”, “Disapproving Parental Figure”</a:t>
-            </a:r>
-            <a:endParaRPr b="0" lang="en-US" sz="1800" spc="-1" strike="noStrike">
-              <a:latin typeface="Arial"/>
+              <a:rPr b="0" lang="en-US" sz="1600" spc="-1" strike="noStrike">
+                <a:latin typeface="Courier New"/>
+              </a:rPr>
+              <a:t>Tropes can be diverse: “Hero”, “</a:t>
+            </a:r>
+            <a:r>
+              <a:rPr b="1" lang="en-US" sz="1600" spc="-1" strike="noStrike">
+                <a:latin typeface="Courier New"/>
+              </a:rPr>
+              <a:t>Big Bad</a:t>
+            </a:r>
+            <a:r>
+              <a:rPr b="0" lang="en-US" sz="1600" spc="-1" strike="noStrike">
+                <a:latin typeface="Courier New"/>
+              </a:rPr>
+              <a:t>”, “Love Triangle”, “Disapproving Parental Figure”</a:t>
+            </a:r>
+            <a:endParaRPr b="0" lang="en-US" sz="1600" spc="-1" strike="noStrike">
+              <a:latin typeface="Courier New"/>
             </a:endParaRPr>
           </a:p>
         </p:txBody>
@@ -10210,7 +10739,7 @@
                 </a:solidFill>
                 <a:latin typeface="Courier New"/>
               </a:rPr>
-              <a:t>Introduction: Premise</a:t>
+              <a:t>1.2 Introduction: Premise</a:t>
             </a:r>
             <a:endParaRPr b="0" lang="en-US" sz="2600" spc="-1" strike="noStrike">
               <a:latin typeface="Arial"/>
@@ -10227,7 +10756,7 @@
         <p:spPr>
           <a:xfrm>
             <a:off x="228600" y="1371600"/>
-            <a:ext cx="3886200" cy="3673800"/>
+            <a:ext cx="3886200" cy="4052880"/>
           </a:xfrm>
           <a:prstGeom prst="rect">
             <a:avLst/>
@@ -10251,12 +10780,42 @@
               <a:buChar char=""/>
             </a:pPr>
             <a:r>
-              <a:rPr b="0" lang="en-US" sz="1800" spc="-1" strike="noStrike">
-                <a:latin typeface="Arial"/>
-              </a:rPr>
-              <a:t>Tropes are fundemental to stories, so which ones are the most popular over the years?</a:t>
-            </a:r>
-            <a:endParaRPr b="0" lang="en-US" sz="1800" spc="-1" strike="noStrike">
+              <a:rPr b="0" lang="en-US" sz="1600" spc="-1" strike="noStrike">
+                <a:latin typeface="Courier New"/>
+              </a:rPr>
+              <a:t>Tropes are fundemental to stories, </a:t>
+            </a:r>
+            <a:r>
+              <a:rPr b="0" i="1" lang="en-US" sz="1600" spc="-1" strike="noStrike">
+                <a:latin typeface="Courier New"/>
+              </a:rPr>
+              <a:t>so which ones are the most </a:t>
+            </a:r>
+            <a:r>
+              <a:rPr b="1" i="1" lang="en-US" sz="1600" spc="-1" strike="noStrike">
+                <a:latin typeface="Courier New"/>
+              </a:rPr>
+              <a:t>popular</a:t>
+            </a:r>
+            <a:r>
+              <a:rPr b="0" i="1" lang="en-US" sz="1600" spc="-1" strike="noStrike">
+                <a:latin typeface="Courier New"/>
+              </a:rPr>
+              <a:t> or </a:t>
+            </a:r>
+            <a:r>
+              <a:rPr b="1" i="1" lang="en-US" sz="1600" spc="-1" strike="noStrike">
+                <a:latin typeface="Courier New"/>
+              </a:rPr>
+              <a:t>profitable</a:t>
+            </a:r>
+            <a:r>
+              <a:rPr b="0" i="1" lang="en-US" sz="1600" spc="-1" strike="noStrike">
+                <a:latin typeface="Courier New"/>
+              </a:rPr>
+              <a:t> over the years?</a:t>
+            </a:r>
+            <a:endParaRPr b="0" lang="en-US" sz="1600" spc="-1" strike="noStrike">
               <a:latin typeface="Arial"/>
             </a:endParaRPr>
           </a:p>
@@ -10269,7 +10828,7 @@
               <a:buFont typeface="Wingdings" charset="2"/>
               <a:buChar char=""/>
             </a:pPr>
-            <a:endParaRPr b="0" lang="en-US" sz="1800" spc="-1" strike="noStrike">
+            <a:endParaRPr b="0" lang="en-US" sz="1600" spc="-1" strike="noStrike">
               <a:latin typeface="Arial"/>
             </a:endParaRPr>
           </a:p>
@@ -10283,12 +10842,24 @@
               <a:buChar char=""/>
             </a:pPr>
             <a:r>
-              <a:rPr b="0" lang="en-US" sz="1800" spc="-1" strike="noStrike">
-                <a:latin typeface="Arial"/>
-              </a:rPr>
-              <a:t>Which Tropes are regularly Oscar-Winning for Best Picture?</a:t>
-            </a:r>
-            <a:endParaRPr b="0" lang="en-US" sz="1800" spc="-1" strike="noStrike">
+              <a:rPr b="0" lang="en-US" sz="1600" spc="-1" strike="noStrike">
+                <a:latin typeface="Courier New"/>
+              </a:rPr>
+              <a:t>Which Tropes are regularly </a:t>
+            </a:r>
+            <a:r>
+              <a:rPr b="1" lang="en-US" sz="1600" spc="-1" strike="noStrike">
+                <a:latin typeface="Courier New"/>
+              </a:rPr>
+              <a:t>Oscar-Winning</a:t>
+            </a:r>
+            <a:r>
+              <a:rPr b="0" lang="en-US" sz="1600" spc="-1" strike="noStrike">
+                <a:latin typeface="Courier New"/>
+              </a:rPr>
+              <a:t> for Best Picture?</a:t>
+            </a:r>
+            <a:endParaRPr b="0" lang="en-US" sz="1600" spc="-1" strike="noStrike">
               <a:latin typeface="Arial"/>
             </a:endParaRPr>
           </a:p>
@@ -10301,7 +10872,7 @@
               <a:buFont typeface="Wingdings" charset="2"/>
               <a:buChar char=""/>
             </a:pPr>
-            <a:endParaRPr b="0" lang="en-US" sz="1800" spc="-1" strike="noStrike">
+            <a:endParaRPr b="0" lang="en-US" sz="1600" spc="-1" strike="noStrike">
               <a:latin typeface="Arial"/>
             </a:endParaRPr>
           </a:p>
@@ -10315,12 +10886,24 @@
               <a:buChar char=""/>
             </a:pPr>
             <a:r>
-              <a:rPr b="0" lang="en-US" sz="1800" spc="-1" strike="noStrike">
-                <a:latin typeface="Arial"/>
-              </a:rPr>
-              <a:t>Which Tropes have been highest grossing, or within certain genres?</a:t>
-            </a:r>
-            <a:endParaRPr b="0" lang="en-US" sz="1800" spc="-1" strike="noStrike">
+              <a:rPr b="0" lang="en-US" sz="1600" spc="-1" strike="noStrike">
+                <a:latin typeface="Courier New"/>
+              </a:rPr>
+              <a:t>Which Tropes have been highest grossing within certain </a:t>
+            </a:r>
+            <a:r>
+              <a:rPr b="1" lang="en-US" sz="1600" spc="-1" strike="noStrike">
+                <a:latin typeface="Courier New"/>
+              </a:rPr>
+              <a:t>genres</a:t>
+            </a:r>
+            <a:r>
+              <a:rPr b="0" lang="en-US" sz="1600" spc="-1" strike="noStrike">
+                <a:latin typeface="Courier New"/>
+              </a:rPr>
+              <a:t>?</a:t>
+            </a:r>
+            <a:endParaRPr b="0" lang="en-US" sz="1600" spc="-1" strike="noStrike">
               <a:latin typeface="Arial"/>
             </a:endParaRPr>
           </a:p>
@@ -10333,7 +10916,7 @@
               <a:buFont typeface="Wingdings" charset="2"/>
               <a:buChar char=""/>
             </a:pPr>
-            <a:endParaRPr b="0" lang="en-US" sz="1800" spc="-1" strike="noStrike">
+            <a:endParaRPr b="0" lang="en-US" sz="1600" spc="-1" strike="noStrike">
               <a:latin typeface="Arial"/>
             </a:endParaRPr>
           </a:p>
@@ -10347,12 +10930,12 @@
               <a:buChar char=""/>
             </a:pPr>
             <a:r>
-              <a:rPr b="0" lang="en-US" sz="1800" spc="-1" strike="noStrike">
-                <a:latin typeface="Arial"/>
+              <a:rPr b="0" lang="en-US" sz="1600" spc="-1" strike="noStrike">
+                <a:latin typeface="Courier New"/>
               </a:rPr>
               <a:t>Is there a discernable relationship at all?</a:t>
             </a:r>
-            <a:endParaRPr b="0" lang="en-US" sz="1800" spc="-1" strike="noStrike">
+            <a:endParaRPr b="0" lang="en-US" sz="1600" spc="-1" strike="noStrike">
               <a:latin typeface="Arial"/>
             </a:endParaRPr>
           </a:p>
@@ -10365,7 +10948,7 @@
               <a:buFont typeface="Wingdings" charset="2"/>
               <a:buChar char=""/>
             </a:pPr>
-            <a:endParaRPr b="0" lang="en-US" sz="1800" spc="-1" strike="noStrike">
+            <a:endParaRPr b="0" lang="en-US" sz="1600" spc="-1" strike="noStrike">
               <a:latin typeface="Arial"/>
             </a:endParaRPr>
           </a:p>
@@ -10378,7 +10961,7 @@
               <a:buFont typeface="Wingdings" charset="2"/>
               <a:buChar char=""/>
             </a:pPr>
-            <a:endParaRPr b="0" lang="en-US" sz="1800" spc="-1" strike="noStrike">
+            <a:endParaRPr b="0" lang="en-US" sz="1600" spc="-1" strike="noStrike">
               <a:latin typeface="Arial"/>
             </a:endParaRPr>
           </a:p>
@@ -10482,7 +11065,7 @@
                 </a:solidFill>
                 <a:latin typeface="Courier New"/>
               </a:rPr>
-              <a:t>Introduction: Execution</a:t>
+              <a:t>1.3 Introduction: Execution</a:t>
             </a:r>
             <a:endParaRPr b="0" lang="en-US" sz="2600" spc="-1" strike="noStrike">
               <a:latin typeface="Arial"/>
@@ -10499,7 +11082,7 @@
         <p:spPr>
           <a:xfrm>
             <a:off x="6172200" y="1371600"/>
-            <a:ext cx="2971800" cy="3673800"/>
+            <a:ext cx="2971800" cy="4001040"/>
           </a:xfrm>
           <a:prstGeom prst="rect">
             <a:avLst/>
@@ -10523,18 +11106,13 @@
               <a:buChar char=""/>
             </a:pPr>
             <a:r>
-              <a:rPr b="0" lang="en-US" sz="1800" spc="-1" strike="noStrike">
-                <a:latin typeface="Arial"/>
-              </a:rPr>
-              <a:t>Used Jupyter notebook, Version control with git, Numpy for Array features, Pandas for Databases </a:t>
-            </a:r>
-            <a:endParaRPr b="0" lang="en-US" sz="1800" spc="-1" strike="noStrike">
-              <a:latin typeface="Arial"/>
-            </a:endParaRPr>
-          </a:p>
-          <a:p>
-            <a:endParaRPr b="0" lang="en-US" sz="1800" spc="-1" strike="noStrike">
-              <a:latin typeface="Arial"/>
+              <a:rPr b="0" lang="en-US" sz="1600" spc="-1" strike="noStrike">
+                <a:latin typeface="Courier New"/>
+              </a:rPr>
+              <a:t>Version control with git&amp;hub, Numpy for Arrays, Pandas for Databases, Counter for Dictionaries</a:t>
+            </a:r>
+            <a:endParaRPr b="0" lang="en-US" sz="1600" spc="-1" strike="noStrike">
+              <a:latin typeface="Courier New"/>
             </a:endParaRPr>
           </a:p>
           <a:p>
@@ -10546,19 +11124,8 @@
               <a:buFont typeface="Wingdings" charset="2"/>
               <a:buChar char=""/>
             </a:pPr>
-            <a:r>
-              <a:rPr b="0" lang="en-US" sz="1800" spc="-1" strike="noStrike">
-                <a:latin typeface="Arial"/>
-              </a:rPr>
-              <a:t>Inflect, re used for text processing and filtering. Title must be converted to web query</a:t>
-            </a:r>
-            <a:endParaRPr b="0" lang="en-US" sz="1800" spc="-1" strike="noStrike">
-              <a:latin typeface="Arial"/>
-            </a:endParaRPr>
-          </a:p>
-          <a:p>
-            <a:endParaRPr b="0" lang="en-US" sz="1800" spc="-1" strike="noStrike">
-              <a:latin typeface="Arial"/>
+            <a:endParaRPr b="0" lang="en-US" sz="1600" spc="-1" strike="noStrike">
+              <a:latin typeface="Courier New"/>
             </a:endParaRPr>
           </a:p>
           <a:p>
@@ -10571,13 +11138,61 @@
               <a:buChar char=""/>
             </a:pPr>
             <a:r>
-              <a:rPr b="0" lang="en-US" sz="1800" spc="-1" strike="noStrike">
-                <a:latin typeface="Arial"/>
-              </a:rPr>
-              <a:t>BeautifulSoup4, and Requests for scraping TvTropes</a:t>
-            </a:r>
-            <a:endParaRPr b="0" lang="en-US" sz="1800" spc="-1" strike="noStrike">
-              <a:latin typeface="Arial"/>
+              <a:rPr b="0" lang="en-US" sz="1600" spc="-1" strike="noStrike">
+                <a:latin typeface="Courier New"/>
+              </a:rPr>
+              <a:t>Matplotlib to plot </a:t>
+            </a:r>
+            <a:endParaRPr b="0" lang="en-US" sz="1600" spc="-1" strike="noStrike">
+              <a:latin typeface="Courier New"/>
+            </a:endParaRPr>
+          </a:p>
+          <a:p>
+            <a:endParaRPr b="0" lang="en-US" sz="1600" spc="-1" strike="noStrike">
+              <a:latin typeface="Courier New"/>
+            </a:endParaRPr>
+          </a:p>
+          <a:p>
+            <a:pPr marL="216000" indent="-216000">
+              <a:buClr>
+                <a:srgbClr val="000000"/>
+              </a:buClr>
+              <a:buSzPct val="45000"/>
+              <a:buFont typeface="Wingdings" charset="2"/>
+              <a:buChar char=""/>
+            </a:pPr>
+            <a:r>
+              <a:rPr b="0" lang="en-US" sz="1600" spc="-1" strike="noStrike">
+                <a:latin typeface="Courier New"/>
+              </a:rPr>
+              <a:t>Inflect, re used for text processing and filtering. Title must be converted to web query</a:t>
+            </a:r>
+            <a:endParaRPr b="0" lang="en-US" sz="1600" spc="-1" strike="noStrike">
+              <a:latin typeface="Courier New"/>
+            </a:endParaRPr>
+          </a:p>
+          <a:p>
+            <a:endParaRPr b="0" lang="en-US" sz="1600" spc="-1" strike="noStrike">
+              <a:latin typeface="Courier New"/>
+            </a:endParaRPr>
+          </a:p>
+          <a:p>
+            <a:pPr marL="216000" indent="-216000">
+              <a:buClr>
+                <a:srgbClr val="000000"/>
+              </a:buClr>
+              <a:buSzPct val="45000"/>
+              <a:buFont typeface="Wingdings" charset="2"/>
+              <a:buChar char=""/>
+            </a:pPr>
+            <a:r>
+              <a:rPr b="0" lang="en-US" sz="1600" spc="-1" strike="noStrike">
+                <a:latin typeface="Courier New"/>
+              </a:rPr>
+              <a:t>BeautifulSoup4, and Requests lib for scraping TvTropes</a:t>
+            </a:r>
+            <a:endParaRPr b="0" lang="en-US" sz="1600" spc="-1" strike="noStrike">
+              <a:latin typeface="Courier New"/>
             </a:endParaRPr>
           </a:p>
         </p:txBody>
@@ -10746,7 +11361,7 @@
                 </a:solidFill>
                 <a:latin typeface="Courier New"/>
               </a:rPr>
-              <a:t>Yearwise Analysis</a:t>
+              <a:t>2. Yearwise Analysis</a:t>
             </a:r>
             <a:endParaRPr b="0" lang="en-US" sz="4400" spc="-1" strike="noStrike">
               <a:latin typeface="Arial"/>
@@ -10877,7 +11492,7 @@
                 </a:solidFill>
                 <a:latin typeface="Courier New"/>
               </a:rPr>
-              <a:t>2008-2017: Oscar Best Picture Winners</a:t>
+              <a:t>2.1 (2008-2017): Oscar Best Picture Winners</a:t>
             </a:r>
             <a:endParaRPr b="0" lang="en-US" sz="2600" spc="-1" strike="noStrike">
               <a:latin typeface="Arial"/>
@@ -10952,19 +11567,32 @@
               <a:rPr b="0" lang="en-US" sz="1800" spc="-1" strike="noStrike">
                 <a:latin typeface="Arial"/>
               </a:rPr>
-              <a:t>5: “Big Bad”</a:t>
+              <a:t>5(56%): </a:t>
             </a:r>
             <a:endParaRPr b="0" lang="en-US" sz="1800" spc="-1" strike="noStrike">
               <a:latin typeface="Arial"/>
             </a:endParaRPr>
           </a:p>
           <a:p>
+            <a:pPr marL="216000" indent="-216000">
+              <a:buClr>
+                <a:srgbClr val="000000"/>
+              </a:buClr>
+              <a:buSzPct val="45000"/>
+              <a:buFont typeface="Wingdings" charset="2"/>
+              <a:buChar char=""/>
+            </a:pPr>
             <a:r>
               <a:rPr b="0" lang="en-US" sz="1800" spc="-1" strike="noStrike">
                 <a:latin typeface="Arial"/>
               </a:rPr>
-              <a:t>3: “Adult Fear”</a:t>
-            </a:r>
+              <a:t>Big Bad</a:t>
+            </a:r>
+            <a:endParaRPr b="0" lang="en-US" sz="1800" spc="-1" strike="noStrike">
+              <a:latin typeface="Arial"/>
+            </a:endParaRPr>
+          </a:p>
+          <a:p>
             <a:endParaRPr b="0" lang="en-US" sz="1800" spc="-1" strike="noStrike">
               <a:latin typeface="Arial"/>
             </a:endParaRPr>
@@ -10974,40 +11602,102 @@
               <a:rPr b="0" lang="en-US" sz="1800" spc="-1" strike="noStrike">
                 <a:latin typeface="Arial"/>
               </a:rPr>
-              <a:t>3: “Dirty Coward”</a:t>
+              <a:t>3 (33%): </a:t>
             </a:r>
             <a:endParaRPr b="0" lang="en-US" sz="1800" spc="-1" strike="noStrike">
               <a:latin typeface="Arial"/>
             </a:endParaRPr>
           </a:p>
           <a:p>
+            <a:pPr marL="216000" indent="-216000">
+              <a:buClr>
+                <a:srgbClr val="000000"/>
+              </a:buClr>
+              <a:buSzPct val="45000"/>
+              <a:buFont typeface="Wingdings" charset="2"/>
+              <a:buChar char=""/>
+            </a:pPr>
             <a:r>
               <a:rPr b="0" lang="en-US" sz="1800" spc="-1" strike="noStrike">
                 <a:latin typeface="Arial"/>
               </a:rPr>
-              <a:t>3: “Earn Your Happy Ending”</a:t>
+              <a:t>Adult Fear</a:t>
             </a:r>
             <a:endParaRPr b="0" lang="en-US" sz="1800" spc="-1" strike="noStrike">
               <a:latin typeface="Arial"/>
             </a:endParaRPr>
           </a:p>
           <a:p>
+            <a:pPr marL="216000" indent="-216000">
+              <a:buClr>
+                <a:srgbClr val="000000"/>
+              </a:buClr>
+              <a:buSzPct val="45000"/>
+              <a:buFont typeface="Wingdings" charset="2"/>
+              <a:buChar char=""/>
+            </a:pPr>
             <a:r>
               <a:rPr b="0" lang="en-US" sz="1800" spc="-1" strike="noStrike">
                 <a:latin typeface="Arial"/>
               </a:rPr>
-              <a:t>3: “In Universe” </a:t>
+              <a:t>Dirty Coward</a:t>
             </a:r>
             <a:endParaRPr b="0" lang="en-US" sz="1800" spc="-1" strike="noStrike">
               <a:latin typeface="Arial"/>
             </a:endParaRPr>
           </a:p>
           <a:p>
+            <a:pPr marL="216000" indent="-216000">
+              <a:buClr>
+                <a:srgbClr val="000000"/>
+              </a:buClr>
+              <a:buSzPct val="45000"/>
+              <a:buFont typeface="Wingdings" charset="2"/>
+              <a:buChar char=""/>
+            </a:pPr>
             <a:r>
               <a:rPr b="0" lang="en-US" sz="1800" spc="-1" strike="noStrike">
                 <a:latin typeface="Arial"/>
               </a:rPr>
-              <a:t>3” “The Cameo”</a:t>
+              <a:t>Earn Your Happy Ending</a:t>
+            </a:r>
+            <a:endParaRPr b="0" lang="en-US" sz="1800" spc="-1" strike="noStrike">
+              <a:latin typeface="Arial"/>
+            </a:endParaRPr>
+          </a:p>
+          <a:p>
+            <a:pPr marL="216000" indent="-216000">
+              <a:buClr>
+                <a:srgbClr val="000000"/>
+              </a:buClr>
+              <a:buSzPct val="45000"/>
+              <a:buFont typeface="Wingdings" charset="2"/>
+              <a:buChar char=""/>
+            </a:pPr>
+            <a:r>
+              <a:rPr b="0" lang="en-US" sz="1800" spc="-1" strike="noStrike">
+                <a:latin typeface="Arial"/>
+              </a:rPr>
+              <a:t>In Universe</a:t>
+            </a:r>
+            <a:endParaRPr b="0" lang="en-US" sz="1800" spc="-1" strike="noStrike">
+              <a:latin typeface="Arial"/>
+            </a:endParaRPr>
+          </a:p>
+          <a:p>
+            <a:pPr marL="216000" indent="-216000">
+              <a:buClr>
+                <a:srgbClr val="000000"/>
+              </a:buClr>
+              <a:buSzPct val="45000"/>
+              <a:buFont typeface="Wingdings" charset="2"/>
+              <a:buChar char=""/>
+            </a:pPr>
+            <a:r>
+              <a:rPr b="0" lang="en-US" sz="1800" spc="-1" strike="noStrike">
+                <a:latin typeface="Arial"/>
+              </a:rPr>
+              <a:t>The Cameo</a:t>
             </a:r>
             <a:endParaRPr b="0" lang="en-US" sz="1800" spc="-1" strike="noStrike">
               <a:latin typeface="Arial"/>
@@ -11089,7 +11779,7 @@
                 </a:solidFill>
                 <a:latin typeface="Courier New"/>
               </a:rPr>
-              <a:t>2008-2017: Highest Grossing (Over $.5B) </a:t>
+              <a:t>2.2 (2008-2017): Highest Grossing (Over $.5B) </a:t>
             </a:r>
             <a:endParaRPr b="0" lang="en-US" sz="2600" spc="-1" strike="noStrike">
               <a:latin typeface="Arial"/>
@@ -11129,7 +11819,7 @@
         <p:spPr>
           <a:xfrm>
             <a:off x="7772400" y="1345680"/>
-            <a:ext cx="2057400" cy="4185720"/>
+            <a:ext cx="2057400" cy="3929760"/>
           </a:xfrm>
           <a:prstGeom prst="rect">
             <a:avLst/>
@@ -11164,57 +11854,53 @@
               <a:rPr b="0" lang="en-US" sz="1800" spc="-1" strike="noStrike">
                 <a:latin typeface="Arial"/>
               </a:rPr>
-              <a:t>6: Arc Words</a:t>
+              <a:t>6 (86%): </a:t>
             </a:r>
             <a:endParaRPr b="0" lang="en-US" sz="1800" spc="-1" strike="noStrike">
               <a:latin typeface="Arial"/>
             </a:endParaRPr>
           </a:p>
           <a:p>
-            <a:endParaRPr b="0" lang="en-US" sz="1800" spc="-1" strike="noStrike">
-              <a:latin typeface="Arial"/>
-            </a:endParaRPr>
-          </a:p>
-          <a:p>
+            <a:pPr marL="216000" indent="-216000">
+              <a:buClr>
+                <a:srgbClr val="000000"/>
+              </a:buClr>
+              <a:buSzPct val="45000"/>
+              <a:buFont typeface="Wingdings" charset="2"/>
+              <a:buChar char=""/>
+            </a:pPr>
             <a:r>
               <a:rPr b="0" lang="en-US" sz="1800" spc="-1" strike="noStrike">
                 <a:latin typeface="Arial"/>
               </a:rPr>
-              <a:t>6: All There In The Manual</a:t>
-            </a:r>
-            <a:br/>
+              <a:t>Arc Words</a:t>
+            </a:r>
             <a:endParaRPr b="0" lang="en-US" sz="1800" spc="-1" strike="noStrike">
               <a:latin typeface="Arial"/>
             </a:endParaRPr>
           </a:p>
           <a:p>
+            <a:pPr marL="216000" indent="-216000">
+              <a:buClr>
+                <a:srgbClr val="000000"/>
+              </a:buClr>
+              <a:buSzPct val="45000"/>
+              <a:buFont typeface="Wingdings" charset="2"/>
+              <a:buChar char=""/>
+            </a:pPr>
             <a:r>
               <a:rPr b="0" lang="en-US" sz="1800" spc="-1" strike="noStrike">
                 <a:latin typeface="Arial"/>
               </a:rPr>
-              <a:t>4: Big Bad</a:t>
-            </a:r>
-            <a:endParaRPr b="0" lang="en-US" sz="1800" spc="-1" strike="noStrike">
-              <a:latin typeface="Arial"/>
-            </a:endParaRPr>
-          </a:p>
-          <a:p>
-            <a:endParaRPr b="0" lang="en-US" sz="1800" spc="-1" strike="noStrike">
-              <a:latin typeface="Arial"/>
-            </a:endParaRPr>
-          </a:p>
-          <a:p>
+              <a:t>All There In The Manual</a:t>
+            </a:r>
+            <a:br/>
             <a:r>
               <a:rPr b="0" lang="en-US" sz="1800" spc="-1" strike="noStrike">
                 <a:latin typeface="Arial"/>
               </a:rPr>
-              <a:t>4: Action Film Quiet Drama Scene</a:t>
-            </a:r>
-            <a:endParaRPr b="0" lang="en-US" sz="1800" spc="-1" strike="noStrike">
-              <a:latin typeface="Arial"/>
-            </a:endParaRPr>
-          </a:p>
-          <a:p>
+              <a:t> </a:t>
+            </a:r>
             <a:endParaRPr b="0" lang="en-US" sz="1800" spc="-1" strike="noStrike">
               <a:latin typeface="Arial"/>
             </a:endParaRPr>
@@ -11224,7 +11910,64 @@
               <a:rPr b="0" lang="en-US" sz="1800" spc="-1" strike="noStrike">
                 <a:latin typeface="Arial"/>
               </a:rPr>
-              <a:t>4: Adult Fear</a:t>
+              <a:t>4 (57%): </a:t>
+            </a:r>
+            <a:endParaRPr b="0" lang="en-US" sz="1800" spc="-1" strike="noStrike">
+              <a:latin typeface="Arial"/>
+            </a:endParaRPr>
+          </a:p>
+          <a:p>
+            <a:pPr marL="216000" indent="-216000">
+              <a:buClr>
+                <a:srgbClr val="000000"/>
+              </a:buClr>
+              <a:buSzPct val="45000"/>
+              <a:buFont typeface="Wingdings" charset="2"/>
+              <a:buChar char=""/>
+            </a:pPr>
+            <a:r>
+              <a:rPr b="0" lang="en-US" sz="1800" spc="-1" strike="noStrike">
+                <a:latin typeface="Arial"/>
+              </a:rPr>
+              <a:t>Big Bad</a:t>
+            </a:r>
+            <a:endParaRPr b="0" lang="en-US" sz="1800" spc="-1" strike="noStrike">
+              <a:latin typeface="Arial"/>
+            </a:endParaRPr>
+          </a:p>
+          <a:p>
+            <a:pPr marL="216000" indent="-216000">
+              <a:buClr>
+                <a:srgbClr val="000000"/>
+              </a:buClr>
+              <a:buSzPct val="45000"/>
+              <a:buFont typeface="Wingdings" charset="2"/>
+              <a:buChar char=""/>
+            </a:pPr>
+            <a:r>
+              <a:rPr b="0" lang="en-US" sz="1800" spc="-1" strike="noStrike">
+                <a:latin typeface="Arial"/>
+              </a:rPr>
+              <a:t>Action Film Quiet Drama Scene</a:t>
+            </a:r>
+            <a:endParaRPr b="0" lang="en-US" sz="1800" spc="-1" strike="noStrike">
+              <a:latin typeface="Arial"/>
+            </a:endParaRPr>
+          </a:p>
+          <a:p>
+            <a:pPr marL="216000" indent="-216000">
+              <a:buClr>
+                <a:srgbClr val="000000"/>
+              </a:buClr>
+              <a:buSzPct val="45000"/>
+              <a:buFont typeface="Wingdings" charset="2"/>
+              <a:buChar char=""/>
+            </a:pPr>
+            <a:r>
+              <a:rPr b="0" lang="en-US" sz="1800" spc="-1" strike="noStrike">
+                <a:latin typeface="Arial"/>
+              </a:rPr>
+              <a:t>Adult Fear</a:t>
             </a:r>
             <a:endParaRPr b="0" lang="en-US" sz="1800" spc="-1" strike="noStrike">
               <a:latin typeface="Arial"/>
@@ -11308,7 +12051,7 @@
                 </a:solidFill>
                 <a:latin typeface="Courier New"/>
               </a:rPr>
-              <a:t>Genrewise Analysis</a:t>
+              <a:t>3. Genrewise Analysis</a:t>
             </a:r>
             <a:endParaRPr b="0" lang="en-US" sz="4400" spc="-1" strike="noStrike">
               <a:latin typeface="Arial"/>

</xml_diff>